<commit_message>
Start on NN methodology
</commit_message>
<xml_diff>
--- a/02. Presentations/PresentationGroup_KP.pptx
+++ b/02. Presentations/PresentationGroup_KP.pptx
@@ -6,10 +6,10 @@
     <p:sldMasterId id="2147483694" r:id="rId5"/>
   </p:sldMasterIdLst>
   <p:notesMasterIdLst>
-    <p:notesMasterId r:id="rId15"/>
+    <p:notesMasterId r:id="rId16"/>
   </p:notesMasterIdLst>
   <p:handoutMasterIdLst>
-    <p:handoutMasterId r:id="rId16"/>
+    <p:handoutMasterId r:id="rId17"/>
   </p:handoutMasterIdLst>
   <p:sldIdLst>
     <p:sldId id="269" r:id="rId6"/>
@@ -21,6 +21,7 @@
     <p:sldId id="275" r:id="rId12"/>
     <p:sldId id="276" r:id="rId13"/>
     <p:sldId id="272" r:id="rId14"/>
+    <p:sldId id="281" r:id="rId15"/>
   </p:sldIdLst>
   <p:sldSz cx="12192000" cy="6858000"/>
   <p:notesSz cx="6858000" cy="9144000"/>
@@ -5049,6 +5050,268 @@
     <p:extLst>
       <p:ext uri="{BB962C8B-B14F-4D97-AF65-F5344CB8AC3E}">
         <p14:creationId xmlns:p14="http://schemas.microsoft.com/office/powerpoint/2010/main" val="939354871"/>
+      </p:ext>
+    </p:extLst>
+  </p:cSld>
+  <p:clrMapOvr>
+    <a:masterClrMapping/>
+  </p:clrMapOvr>
+</p:sld>
+</file>
+
+<file path=ppt/slides/slide10.xml><?xml version="1.0" encoding="utf-8"?>
+<p:sld xmlns:a="http://schemas.openxmlformats.org/drawingml/2006/main" xmlns:r="http://schemas.openxmlformats.org/officeDocument/2006/relationships" xmlns:p="http://schemas.openxmlformats.org/presentationml/2006/main">
+  <p:cSld>
+    <p:spTree>
+      <p:nvGrpSpPr>
+        <p:cNvPr id="1" name=""/>
+        <p:cNvGrpSpPr/>
+        <p:nvPr/>
+      </p:nvGrpSpPr>
+      <p:grpSpPr>
+        <a:xfrm>
+          <a:off x="0" y="0"/>
+          <a:ext cx="0" cy="0"/>
+          <a:chOff x="0" y="0"/>
+          <a:chExt cx="0" cy="0"/>
+        </a:xfrm>
+      </p:grpSpPr>
+      <p:sp>
+        <p:nvSpPr>
+          <p:cNvPr id="2" name="Content Placeholder 1"/>
+          <p:cNvSpPr>
+            <a:spLocks noGrp="1"/>
+          </p:cNvSpPr>
+          <p:nvPr>
+            <p:ph idx="1"/>
+          </p:nvPr>
+        </p:nvSpPr>
+        <p:spPr/>
+        <p:txBody>
+          <a:bodyPr>
+            <a:normAutofit fontScale="92500" lnSpcReduction="10000"/>
+          </a:bodyPr>
+          <a:lstStyle/>
+          <a:p>
+            <a:r>
+              <a:rPr lang="en-US" dirty="0" smtClean="0"/>
+              <a:t>Goal </a:t>
+            </a:r>
+          </a:p>
+          <a:p>
+            <a:pPr lvl="1"/>
+            <a:r>
+              <a:rPr lang="en-US" dirty="0" smtClean="0"/>
+              <a:t>Estimate hourly operational cost </a:t>
+            </a:r>
+            <a:r>
+              <a:rPr lang="en-US" dirty="0" smtClean="0">
+                <a:sym typeface="Wingdings" panose="05000000000000000000" pitchFamily="2" charset="2"/>
+              </a:rPr>
+              <a:t>of the OPF problem</a:t>
+            </a:r>
+          </a:p>
+          <a:p>
+            <a:pPr lvl="1"/>
+            <a:r>
+              <a:rPr lang="en-US" dirty="0" smtClean="0">
+                <a:sym typeface="Wingdings" panose="05000000000000000000" pitchFamily="2" charset="2"/>
+              </a:rPr>
+              <a:t>Sensitive to time-series changes </a:t>
+            </a:r>
+          </a:p>
+          <a:p>
+            <a:pPr lvl="1"/>
+            <a:r>
+              <a:rPr lang="en-US" dirty="0" smtClean="0">
+                <a:sym typeface="Wingdings" panose="05000000000000000000" pitchFamily="2" charset="2"/>
+              </a:rPr>
+              <a:t>Sensitive to physical network changes </a:t>
+            </a:r>
+          </a:p>
+          <a:p>
+            <a:r>
+              <a:rPr lang="en-US" dirty="0" smtClean="0">
+                <a:sym typeface="Wingdings" panose="05000000000000000000" pitchFamily="2" charset="2"/>
+              </a:rPr>
+              <a:t>Approach </a:t>
+            </a:r>
+          </a:p>
+          <a:p>
+            <a:pPr lvl="1"/>
+            <a:r>
+              <a:rPr lang="en-US" dirty="0" smtClean="0">
+                <a:sym typeface="Wingdings" panose="05000000000000000000" pitchFamily="2" charset="2"/>
+              </a:rPr>
+              <a:t>Neural network works on hourly basis  Estimates one cost value</a:t>
+            </a:r>
+          </a:p>
+          <a:p>
+            <a:pPr lvl="1"/>
+            <a:r>
+              <a:rPr lang="en-US" dirty="0" smtClean="0">
+                <a:sym typeface="Wingdings" panose="05000000000000000000" pitchFamily="2" charset="2"/>
+              </a:rPr>
+              <a:t>Single output (cost)</a:t>
+            </a:r>
+          </a:p>
+          <a:p>
+            <a:pPr lvl="1"/>
+            <a:r>
+              <a:rPr lang="en-US" dirty="0" smtClean="0">
+                <a:sym typeface="Wingdings" panose="05000000000000000000" pitchFamily="2" charset="2"/>
+              </a:rPr>
+              <a:t>Input contains</a:t>
+            </a:r>
+          </a:p>
+          <a:p>
+            <a:pPr lvl="2"/>
+            <a:r>
+              <a:rPr lang="en-US" dirty="0" smtClean="0">
+                <a:sym typeface="Wingdings" panose="05000000000000000000" pitchFamily="2" charset="2"/>
+              </a:rPr>
+              <a:t>Demand (per node)</a:t>
+            </a:r>
+          </a:p>
+          <a:p>
+            <a:pPr lvl="2"/>
+            <a:r>
+              <a:rPr lang="en-US" dirty="0" smtClean="0">
+                <a:sym typeface="Wingdings" panose="05000000000000000000" pitchFamily="2" charset="2"/>
+              </a:rPr>
+              <a:t>Renewable availability factors (per technology per location)</a:t>
+            </a:r>
+          </a:p>
+          <a:p>
+            <a:pPr lvl="2"/>
+            <a:r>
+              <a:rPr lang="en-US" dirty="0" smtClean="0">
+                <a:sym typeface="Wingdings" panose="05000000000000000000" pitchFamily="2" charset="2"/>
+              </a:rPr>
+              <a:t>Admittance matrix</a:t>
+            </a:r>
+          </a:p>
+          <a:p>
+            <a:pPr marL="457200" lvl="1" indent="0">
+              <a:buNone/>
+            </a:pPr>
+            <a:r>
+              <a:rPr lang="en-US" dirty="0" smtClean="0">
+                <a:sym typeface="Wingdings" panose="05000000000000000000" pitchFamily="2" charset="2"/>
+              </a:rPr>
+              <a:t> Size of input vector quickly grows with number </a:t>
+            </a:r>
+            <a:r>
+              <a:rPr lang="en-US" smtClean="0">
+                <a:sym typeface="Wingdings" panose="05000000000000000000" pitchFamily="2" charset="2"/>
+              </a:rPr>
+              <a:t>of buses</a:t>
+            </a:r>
+            <a:endParaRPr lang="en-US" dirty="0" smtClean="0">
+              <a:sym typeface="Wingdings" panose="05000000000000000000" pitchFamily="2" charset="2"/>
+            </a:endParaRPr>
+          </a:p>
+          <a:p>
+            <a:pPr lvl="2"/>
+            <a:endParaRPr lang="en-US" dirty="0" smtClean="0">
+              <a:sym typeface="Wingdings" panose="05000000000000000000" pitchFamily="2" charset="2"/>
+            </a:endParaRPr>
+          </a:p>
+          <a:p>
+            <a:pPr lvl="2"/>
+            <a:endParaRPr lang="en-US" dirty="0" smtClean="0">
+              <a:sym typeface="Wingdings" panose="05000000000000000000" pitchFamily="2" charset="2"/>
+            </a:endParaRPr>
+          </a:p>
+          <a:p>
+            <a:pPr lvl="1"/>
+            <a:endParaRPr lang="en-US" dirty="0" smtClean="0">
+              <a:sym typeface="Wingdings" panose="05000000000000000000" pitchFamily="2" charset="2"/>
+            </a:endParaRPr>
+          </a:p>
+          <a:p>
+            <a:pPr lvl="1"/>
+            <a:endParaRPr lang="en-US" dirty="0" smtClean="0"/>
+          </a:p>
+          <a:p>
+            <a:pPr lvl="1"/>
+            <a:endParaRPr lang="en-US" dirty="0"/>
+          </a:p>
+        </p:txBody>
+      </p:sp>
+      <p:sp>
+        <p:nvSpPr>
+          <p:cNvPr id="3" name="Footer Placeholder 2"/>
+          <p:cNvSpPr>
+            <a:spLocks noGrp="1"/>
+          </p:cNvSpPr>
+          <p:nvPr>
+            <p:ph type="ftr" sz="quarter" idx="11"/>
+          </p:nvPr>
+        </p:nvSpPr>
+        <p:spPr/>
+        <p:txBody>
+          <a:bodyPr/>
+          <a:lstStyle/>
+          <a:p>
+            <a:r>
+              <a:rPr lang="nl-NL" smtClean="0"/>
+              <a:t>Ingenieurswetenschappen, Werktuigkunde, TME</a:t>
+            </a:r>
+            <a:endParaRPr lang="nl-NL"/>
+          </a:p>
+        </p:txBody>
+      </p:sp>
+      <p:sp>
+        <p:nvSpPr>
+          <p:cNvPr id="4" name="Slide Number Placeholder 3"/>
+          <p:cNvSpPr>
+            <a:spLocks noGrp="1"/>
+          </p:cNvSpPr>
+          <p:nvPr>
+            <p:ph type="sldNum" sz="quarter" idx="12"/>
+          </p:nvPr>
+        </p:nvSpPr>
+        <p:spPr/>
+        <p:txBody>
+          <a:bodyPr/>
+          <a:lstStyle/>
+          <a:p>
+            <a:fld id="{0A297500-7527-634B-90F4-69D0994C32B4}" type="slidenum">
+              <a:rPr lang="nl-NL" smtClean="0"/>
+              <a:t>10</a:t>
+            </a:fld>
+            <a:endParaRPr lang="nl-NL"/>
+          </a:p>
+        </p:txBody>
+      </p:sp>
+      <p:sp>
+        <p:nvSpPr>
+          <p:cNvPr id="5" name="Title 4"/>
+          <p:cNvSpPr>
+            <a:spLocks noGrp="1"/>
+          </p:cNvSpPr>
+          <p:nvPr>
+            <p:ph type="title"/>
+          </p:nvPr>
+        </p:nvSpPr>
+        <p:spPr/>
+        <p:txBody>
+          <a:bodyPr/>
+          <a:lstStyle/>
+          <a:p>
+            <a:r>
+              <a:rPr lang="en-US" dirty="0" smtClean="0"/>
+              <a:t>Neural Network for cost estimation</a:t>
+            </a:r>
+            <a:endParaRPr lang="en-US" dirty="0"/>
+          </a:p>
+        </p:txBody>
+      </p:sp>
+    </p:spTree>
+    <p:extLst>
+      <p:ext uri="{BB962C8B-B14F-4D97-AF65-F5344CB8AC3E}">
+        <p14:creationId xmlns:p14="http://schemas.microsoft.com/office/powerpoint/2010/main" val="2844186355"/>
       </p:ext>
     </p:extLst>
   </p:cSld>
@@ -20579,23 +20842,6 @@
 </file>
 
 <file path=customXml/item1.xml><?xml version="1.0" encoding="utf-8"?>
-<?mso-contentType ?>
-<FormTemplates xmlns="http://schemas.microsoft.com/sharepoint/v3/contenttype/forms">
-  <Display>DocumentLibraryForm</Display>
-  <Edit>DocumentLibraryForm</Edit>
-  <New>DocumentLibraryForm</New>
-</FormTemplates>
-</file>
-
-<file path=customXml/item2.xml><?xml version="1.0" encoding="utf-8"?>
-<p:properties xmlns:p="http://schemas.microsoft.com/office/2006/metadata/properties" xmlns:xsi="http://www.w3.org/2001/XMLSchema-instance" xmlns:pc="http://schemas.microsoft.com/office/infopath/2007/PartnerControls">
-  <documentManagement>
-    <_activity xmlns="fd689c1b-2561-4a46-ae04-6449f963ff76" xsi:nil="true"/>
-  </documentManagement>
-</p:properties>
-</file>
-
-<file path=customXml/item3.xml><?xml version="1.0" encoding="utf-8"?>
 <ct:contentTypeSchema xmlns:ct="http://schemas.microsoft.com/office/2006/metadata/contentType" xmlns:ma="http://schemas.microsoft.com/office/2006/metadata/properties/metaAttributes" ct:_="" ma:_="" ma:contentTypeName="Document" ma:contentTypeID="0x010100AF89B70DD9C08446A8443DF534F7285E" ma:contentTypeVersion="13" ma:contentTypeDescription="Create a new document." ma:contentTypeScope="" ma:versionID="ecc4e1277db930f2a9760bc5b361f436">
   <xsd:schema xmlns:xsd="http://www.w3.org/2001/XMLSchema" xmlns:xs="http://www.w3.org/2001/XMLSchema" xmlns:p="http://schemas.microsoft.com/office/2006/metadata/properties" xmlns:ns3="fd689c1b-2561-4a46-ae04-6449f963ff76" xmlns:ns4="04677cab-20cd-44d8-974c-14c664890eaa" targetNamespace="http://schemas.microsoft.com/office/2006/metadata/properties" ma:root="true" ma:fieldsID="494f09148d3a63d1912cdfb9c603bec2" ns3:_="" ns4:_="">
     <xsd:import namespace="fd689c1b-2561-4a46-ae04-6449f963ff76"/>
@@ -20816,32 +21062,24 @@
 </ct:contentTypeSchema>
 </file>
 
-<file path=customXml/itemProps1.xml><?xml version="1.0" encoding="utf-8"?>
-<ds:datastoreItem xmlns:ds="http://schemas.openxmlformats.org/officeDocument/2006/customXml" ds:itemID="{754D1958-5725-488F-A4D5-DA9E8FDB5252}">
-  <ds:schemaRefs>
-    <ds:schemaRef ds:uri="http://schemas.microsoft.com/sharepoint/v3/contenttype/forms"/>
-  </ds:schemaRefs>
-</ds:datastoreItem>
+<file path=customXml/item2.xml><?xml version="1.0" encoding="utf-8"?>
+<p:properties xmlns:p="http://schemas.microsoft.com/office/2006/metadata/properties" xmlns:xsi="http://www.w3.org/2001/XMLSchema-instance" xmlns:pc="http://schemas.microsoft.com/office/infopath/2007/PartnerControls">
+  <documentManagement>
+    <_activity xmlns="fd689c1b-2561-4a46-ae04-6449f963ff76" xsi:nil="true"/>
+  </documentManagement>
+</p:properties>
 </file>
 
-<file path=customXml/itemProps2.xml><?xml version="1.0" encoding="utf-8"?>
-<ds:datastoreItem xmlns:ds="http://schemas.openxmlformats.org/officeDocument/2006/customXml" ds:itemID="{6D3CDF3A-BF48-4B5B-B3E9-7B37F916BE05}">
-  <ds:schemaRefs>
-    <ds:schemaRef ds:uri="http://purl.org/dc/dcmitype/"/>
-    <ds:schemaRef ds:uri="http://schemas.microsoft.com/office/infopath/2007/PartnerControls"/>
-    <ds:schemaRef ds:uri="http://purl.org/dc/elements/1.1/"/>
-    <ds:schemaRef ds:uri="http://schemas.microsoft.com/office/2006/metadata/properties"/>
-    <ds:schemaRef ds:uri="04677cab-20cd-44d8-974c-14c664890eaa"/>
-    <ds:schemaRef ds:uri="fd689c1b-2561-4a46-ae04-6449f963ff76"/>
-    <ds:schemaRef ds:uri="http://purl.org/dc/terms/"/>
-    <ds:schemaRef ds:uri="http://schemas.microsoft.com/office/2006/documentManagement/types"/>
-    <ds:schemaRef ds:uri="http://schemas.openxmlformats.org/package/2006/metadata/core-properties"/>
-    <ds:schemaRef ds:uri="http://www.w3.org/XML/1998/namespace"/>
-  </ds:schemaRefs>
-</ds:datastoreItem>
+<file path=customXml/item3.xml><?xml version="1.0" encoding="utf-8"?>
+<?mso-contentType ?>
+<FormTemplates xmlns="http://schemas.microsoft.com/sharepoint/v3/contenttype/forms">
+  <Display>DocumentLibraryForm</Display>
+  <Edit>DocumentLibraryForm</Edit>
+  <New>DocumentLibraryForm</New>
+</FormTemplates>
 </file>
 
-<file path=customXml/itemProps3.xml><?xml version="1.0" encoding="utf-8"?>
+<file path=customXml/itemProps1.xml><?xml version="1.0" encoding="utf-8"?>
 <ds:datastoreItem xmlns:ds="http://schemas.openxmlformats.org/officeDocument/2006/customXml" ds:itemID="{038AB51F-98E0-4779-8180-600DAF31B4BF}">
   <ds:schemaRefs>
     <ds:schemaRef ds:uri="http://schemas.microsoft.com/office/2006/metadata/contentType"/>
@@ -20858,4 +21096,29 @@
     <ds:schemaRef ds:uri="http://schemas.microsoft.com/internal/obd"/>
   </ds:schemaRefs>
 </ds:datastoreItem>
+</file>
+
+<file path=customXml/itemProps2.xml><?xml version="1.0" encoding="utf-8"?>
+<ds:datastoreItem xmlns:ds="http://schemas.openxmlformats.org/officeDocument/2006/customXml" ds:itemID="{6D3CDF3A-BF48-4B5B-B3E9-7B37F916BE05}">
+  <ds:schemaRefs>
+    <ds:schemaRef ds:uri="http://purl.org/dc/terms/"/>
+    <ds:schemaRef ds:uri="http://schemas.openxmlformats.org/package/2006/metadata/core-properties"/>
+    <ds:schemaRef ds:uri="http://purl.org/dc/dcmitype/"/>
+    <ds:schemaRef ds:uri="http://schemas.microsoft.com/office/infopath/2007/PartnerControls"/>
+    <ds:schemaRef ds:uri="http://purl.org/dc/elements/1.1/"/>
+    <ds:schemaRef ds:uri="http://schemas.microsoft.com/office/2006/metadata/properties"/>
+    <ds:schemaRef ds:uri="04677cab-20cd-44d8-974c-14c664890eaa"/>
+    <ds:schemaRef ds:uri="http://schemas.microsoft.com/office/2006/documentManagement/types"/>
+    <ds:schemaRef ds:uri="fd689c1b-2561-4a46-ae04-6449f963ff76"/>
+    <ds:schemaRef ds:uri="http://www.w3.org/XML/1998/namespace"/>
+  </ds:schemaRefs>
+</ds:datastoreItem>
+</file>
+
+<file path=customXml/itemProps3.xml><?xml version="1.0" encoding="utf-8"?>
+<ds:datastoreItem xmlns:ds="http://schemas.openxmlformats.org/officeDocument/2006/customXml" ds:itemID="{754D1958-5725-488F-A4D5-DA9E8FDB5252}">
+  <ds:schemaRefs>
+    <ds:schemaRef ds:uri="http://schemas.microsoft.com/sharepoint/v3/contenttype/forms"/>
+  </ds:schemaRefs>
+</ds:datastoreItem>
 </file>
</xml_diff>

<commit_message>
NN methodology slide 1
</commit_message>
<xml_diff>
--- a/02. Presentations/PresentationGroup_KP.pptx
+++ b/02. Presentations/PresentationGroup_KP.pptx
@@ -20,8 +20,8 @@
     <p:sldId id="280" r:id="rId11"/>
     <p:sldId id="275" r:id="rId12"/>
     <p:sldId id="276" r:id="rId13"/>
-    <p:sldId id="272" r:id="rId14"/>
-    <p:sldId id="281" r:id="rId15"/>
+    <p:sldId id="281" r:id="rId14"/>
+    <p:sldId id="272" r:id="rId15"/>
   </p:sldIdLst>
   <p:sldSz cx="12192000" cy="6858000"/>
   <p:notesSz cx="6858000" cy="9144000"/>
@@ -5078,170 +5078,7 @@
       </p:grpSpPr>
       <p:sp>
         <p:nvSpPr>
-          <p:cNvPr id="2" name="Content Placeholder 1"/>
-          <p:cNvSpPr>
-            <a:spLocks noGrp="1"/>
-          </p:cNvSpPr>
-          <p:nvPr>
-            <p:ph idx="1"/>
-          </p:nvPr>
-        </p:nvSpPr>
-        <p:spPr/>
-        <p:txBody>
-          <a:bodyPr>
-            <a:normAutofit fontScale="92500" lnSpcReduction="10000"/>
-          </a:bodyPr>
-          <a:lstStyle/>
-          <a:p>
-            <a:r>
-              <a:rPr lang="en-US" dirty="0" smtClean="0"/>
-              <a:t>Goal </a:t>
-            </a:r>
-          </a:p>
-          <a:p>
-            <a:pPr lvl="1"/>
-            <a:r>
-              <a:rPr lang="en-US" dirty="0" smtClean="0"/>
-              <a:t>Estimate hourly operational cost </a:t>
-            </a:r>
-            <a:r>
-              <a:rPr lang="en-US" dirty="0" smtClean="0">
-                <a:sym typeface="Wingdings" panose="05000000000000000000" pitchFamily="2" charset="2"/>
-              </a:rPr>
-              <a:t>of the OPF problem</a:t>
-            </a:r>
-          </a:p>
-          <a:p>
-            <a:pPr lvl="1"/>
-            <a:r>
-              <a:rPr lang="en-US" dirty="0" smtClean="0">
-                <a:sym typeface="Wingdings" panose="05000000000000000000" pitchFamily="2" charset="2"/>
-              </a:rPr>
-              <a:t>Sensitive to time-series changes </a:t>
-            </a:r>
-          </a:p>
-          <a:p>
-            <a:pPr lvl="1"/>
-            <a:r>
-              <a:rPr lang="en-US" dirty="0" smtClean="0">
-                <a:sym typeface="Wingdings" panose="05000000000000000000" pitchFamily="2" charset="2"/>
-              </a:rPr>
-              <a:t>Sensitive to physical network changes </a:t>
-            </a:r>
-          </a:p>
-          <a:p>
-            <a:r>
-              <a:rPr lang="en-US" dirty="0" smtClean="0">
-                <a:sym typeface="Wingdings" panose="05000000000000000000" pitchFamily="2" charset="2"/>
-              </a:rPr>
-              <a:t>Approach </a:t>
-            </a:r>
-          </a:p>
-          <a:p>
-            <a:pPr lvl="1"/>
-            <a:r>
-              <a:rPr lang="en-US" dirty="0" smtClean="0">
-                <a:sym typeface="Wingdings" panose="05000000000000000000" pitchFamily="2" charset="2"/>
-              </a:rPr>
-              <a:t>Neural network works on hourly basis  Estimates one cost value</a:t>
-            </a:r>
-          </a:p>
-          <a:p>
-            <a:pPr lvl="1"/>
-            <a:r>
-              <a:rPr lang="en-US" dirty="0" smtClean="0">
-                <a:sym typeface="Wingdings" panose="05000000000000000000" pitchFamily="2" charset="2"/>
-              </a:rPr>
-              <a:t>Single output (cost)</a:t>
-            </a:r>
-          </a:p>
-          <a:p>
-            <a:pPr lvl="1"/>
-            <a:r>
-              <a:rPr lang="en-US" dirty="0" smtClean="0">
-                <a:sym typeface="Wingdings" panose="05000000000000000000" pitchFamily="2" charset="2"/>
-              </a:rPr>
-              <a:t>Input contains</a:t>
-            </a:r>
-          </a:p>
-          <a:p>
-            <a:pPr lvl="2"/>
-            <a:r>
-              <a:rPr lang="en-US" dirty="0" smtClean="0">
-                <a:sym typeface="Wingdings" panose="05000000000000000000" pitchFamily="2" charset="2"/>
-              </a:rPr>
-              <a:t>Demand (per node)</a:t>
-            </a:r>
-          </a:p>
-          <a:p>
-            <a:pPr lvl="2"/>
-            <a:r>
-              <a:rPr lang="en-US" dirty="0" smtClean="0">
-                <a:sym typeface="Wingdings" panose="05000000000000000000" pitchFamily="2" charset="2"/>
-              </a:rPr>
-              <a:t>Renewable availability factors (per technology per location)</a:t>
-            </a:r>
-          </a:p>
-          <a:p>
-            <a:pPr lvl="2"/>
-            <a:r>
-              <a:rPr lang="en-US" dirty="0" smtClean="0">
-                <a:sym typeface="Wingdings" panose="05000000000000000000" pitchFamily="2" charset="2"/>
-              </a:rPr>
-              <a:t>Admittance matrix</a:t>
-            </a:r>
-          </a:p>
-          <a:p>
-            <a:pPr marL="457200" lvl="1" indent="0">
-              <a:buNone/>
-            </a:pPr>
-            <a:r>
-              <a:rPr lang="en-US" dirty="0" smtClean="0">
-                <a:sym typeface="Wingdings" panose="05000000000000000000" pitchFamily="2" charset="2"/>
-              </a:rPr>
-              <a:t> Size of input vector quickly grows with number </a:t>
-            </a:r>
-            <a:r>
-              <a:rPr lang="en-US" smtClean="0">
-                <a:sym typeface="Wingdings" panose="05000000000000000000" pitchFamily="2" charset="2"/>
-              </a:rPr>
-              <a:t>of buses</a:t>
-            </a:r>
-            <a:endParaRPr lang="en-US" dirty="0" smtClean="0">
-              <a:sym typeface="Wingdings" panose="05000000000000000000" pitchFamily="2" charset="2"/>
-            </a:endParaRPr>
-          </a:p>
-          <a:p>
-            <a:pPr lvl="2"/>
-            <a:endParaRPr lang="en-US" dirty="0" smtClean="0">
-              <a:sym typeface="Wingdings" panose="05000000000000000000" pitchFamily="2" charset="2"/>
-            </a:endParaRPr>
-          </a:p>
-          <a:p>
-            <a:pPr lvl="2"/>
-            <a:endParaRPr lang="en-US" dirty="0" smtClean="0">
-              <a:sym typeface="Wingdings" panose="05000000000000000000" pitchFamily="2" charset="2"/>
-            </a:endParaRPr>
-          </a:p>
-          <a:p>
-            <a:pPr lvl="1"/>
-            <a:endParaRPr lang="en-US" dirty="0" smtClean="0">
-              <a:sym typeface="Wingdings" panose="05000000000000000000" pitchFamily="2" charset="2"/>
-            </a:endParaRPr>
-          </a:p>
-          <a:p>
-            <a:pPr lvl="1"/>
-            <a:endParaRPr lang="en-US" dirty="0" smtClean="0"/>
-          </a:p>
-          <a:p>
-            <a:pPr lvl="1"/>
-            <a:endParaRPr lang="en-US" dirty="0"/>
-          </a:p>
-        </p:txBody>
-      </p:sp>
-      <p:sp>
-        <p:nvSpPr>
-          <p:cNvPr id="3" name="Footer Placeholder 2"/>
+          <p:cNvPr id="2" name="Footer Placeholder 1"/>
           <p:cNvSpPr>
             <a:spLocks noGrp="1"/>
           </p:cNvSpPr>
@@ -5255,16 +5092,15 @@
           <a:lstStyle/>
           <a:p>
             <a:r>
-              <a:rPr lang="nl-NL" smtClean="0"/>
+              <a:rPr lang="nl-NL"/>
               <a:t>Ingenieurswetenschappen, Werktuigkunde, TME</a:t>
             </a:r>
-            <a:endParaRPr lang="nl-NL"/>
           </a:p>
         </p:txBody>
       </p:sp>
       <p:sp>
         <p:nvSpPr>
-          <p:cNvPr id="4" name="Slide Number Placeholder 3"/>
+          <p:cNvPr id="3" name="Slide Number Placeholder 2"/>
           <p:cNvSpPr>
             <a:spLocks noGrp="1"/>
           </p:cNvSpPr>
@@ -5285,33 +5121,40 @@
           </a:p>
         </p:txBody>
       </p:sp>
-      <p:sp>
-        <p:nvSpPr>
-          <p:cNvPr id="5" name="Title 4"/>
-          <p:cNvSpPr>
-            <a:spLocks noGrp="1"/>
-          </p:cNvSpPr>
-          <p:nvPr>
-            <p:ph type="title"/>
-          </p:nvPr>
-        </p:nvSpPr>
-        <p:spPr/>
-        <p:txBody>
-          <a:bodyPr/>
-          <a:lstStyle/>
-          <a:p>
-            <a:r>
-              <a:rPr lang="en-US" dirty="0" smtClean="0"/>
-              <a:t>Neural Network for cost estimation</a:t>
-            </a:r>
-            <a:endParaRPr lang="en-US" dirty="0"/>
-          </a:p>
-        </p:txBody>
-      </p:sp>
+      <p:pic>
+        <p:nvPicPr>
+          <p:cNvPr id="4" name="Picture 3"/>
+          <p:cNvPicPr>
+            <a:picLocks noChangeAspect="1"/>
+          </p:cNvPicPr>
+          <p:nvPr/>
+        </p:nvPicPr>
+        <p:blipFill>
+          <a:blip r:embed="rId2">
+            <a:extLst>
+              <a:ext uri="{28A0092B-C50C-407E-A947-70E740481C1C}">
+                <a14:useLocalDpi xmlns:a14="http://schemas.microsoft.com/office/drawing/2010/main" val="0"/>
+              </a:ext>
+            </a:extLst>
+          </a:blip>
+          <a:stretch>
+            <a:fillRect/>
+          </a:stretch>
+        </p:blipFill>
+        <p:spPr>
+          <a:xfrm>
+            <a:off x="758283" y="115326"/>
+            <a:ext cx="10283407" cy="5782439"/>
+          </a:xfrm>
+          <a:prstGeom prst="rect">
+            <a:avLst/>
+          </a:prstGeom>
+        </p:spPr>
+      </p:pic>
     </p:spTree>
     <p:extLst>
       <p:ext uri="{BB962C8B-B14F-4D97-AF65-F5344CB8AC3E}">
-        <p14:creationId xmlns:p14="http://schemas.microsoft.com/office/powerpoint/2010/main" val="2844186355"/>
+        <p14:creationId xmlns:p14="http://schemas.microsoft.com/office/powerpoint/2010/main" val="261656653"/>
       </p:ext>
     </p:extLst>
   </p:cSld>
@@ -19711,7 +19554,161 @@
       </p:grpSpPr>
       <p:sp>
         <p:nvSpPr>
-          <p:cNvPr id="2" name="Footer Placeholder 1"/>
+          <p:cNvPr id="2" name="Content Placeholder 1"/>
+          <p:cNvSpPr>
+            <a:spLocks noGrp="1"/>
+          </p:cNvSpPr>
+          <p:nvPr>
+            <p:ph idx="1"/>
+          </p:nvPr>
+        </p:nvSpPr>
+        <p:spPr/>
+        <p:txBody>
+          <a:bodyPr>
+            <a:normAutofit fontScale="92500" lnSpcReduction="10000"/>
+          </a:bodyPr>
+          <a:lstStyle/>
+          <a:p>
+            <a:r>
+              <a:rPr lang="en-US" dirty="0" smtClean="0"/>
+              <a:t>Goal </a:t>
+            </a:r>
+          </a:p>
+          <a:p>
+            <a:pPr lvl="1"/>
+            <a:r>
+              <a:rPr lang="en-US" dirty="0" smtClean="0"/>
+              <a:t>Estimate the hourly operational cost </a:t>
+            </a:r>
+            <a:r>
+              <a:rPr lang="en-US" dirty="0" smtClean="0">
+                <a:sym typeface="Wingdings" panose="05000000000000000000" pitchFamily="2" charset="2"/>
+              </a:rPr>
+              <a:t>of the OPF problem</a:t>
+            </a:r>
+          </a:p>
+          <a:p>
+            <a:pPr lvl="1"/>
+            <a:r>
+              <a:rPr lang="en-US" dirty="0" smtClean="0">
+                <a:sym typeface="Wingdings" panose="05000000000000000000" pitchFamily="2" charset="2"/>
+              </a:rPr>
+              <a:t>Sensitive to time-series changes </a:t>
+            </a:r>
+          </a:p>
+          <a:p>
+            <a:pPr lvl="1"/>
+            <a:r>
+              <a:rPr lang="en-US" dirty="0" smtClean="0">
+                <a:sym typeface="Wingdings" panose="05000000000000000000" pitchFamily="2" charset="2"/>
+              </a:rPr>
+              <a:t>Sensitive to physical network changes </a:t>
+            </a:r>
+          </a:p>
+          <a:p>
+            <a:r>
+              <a:rPr lang="en-US" dirty="0" smtClean="0">
+                <a:sym typeface="Wingdings" panose="05000000000000000000" pitchFamily="2" charset="2"/>
+              </a:rPr>
+              <a:t>Approach </a:t>
+            </a:r>
+          </a:p>
+          <a:p>
+            <a:pPr lvl="1"/>
+            <a:r>
+              <a:rPr lang="en-US" dirty="0" smtClean="0">
+                <a:sym typeface="Wingdings" panose="05000000000000000000" pitchFamily="2" charset="2"/>
+              </a:rPr>
+              <a:t>Neural network works on hourly basis  Estimates one cost value</a:t>
+            </a:r>
+          </a:p>
+          <a:p>
+            <a:pPr lvl="1"/>
+            <a:r>
+              <a:rPr lang="en-US" dirty="0" smtClean="0">
+                <a:sym typeface="Wingdings" panose="05000000000000000000" pitchFamily="2" charset="2"/>
+              </a:rPr>
+              <a:t>Single output (cost)</a:t>
+            </a:r>
+          </a:p>
+          <a:p>
+            <a:pPr lvl="1"/>
+            <a:r>
+              <a:rPr lang="en-US" dirty="0" smtClean="0">
+                <a:sym typeface="Wingdings" panose="05000000000000000000" pitchFamily="2" charset="2"/>
+              </a:rPr>
+              <a:t>Input contains</a:t>
+            </a:r>
+          </a:p>
+          <a:p>
+            <a:pPr lvl="2"/>
+            <a:r>
+              <a:rPr lang="en-US" dirty="0" smtClean="0">
+                <a:sym typeface="Wingdings" panose="05000000000000000000" pitchFamily="2" charset="2"/>
+              </a:rPr>
+              <a:t>Demand (per node)</a:t>
+            </a:r>
+          </a:p>
+          <a:p>
+            <a:pPr lvl="2"/>
+            <a:r>
+              <a:rPr lang="en-US" dirty="0" smtClean="0">
+                <a:sym typeface="Wingdings" panose="05000000000000000000" pitchFamily="2" charset="2"/>
+              </a:rPr>
+              <a:t>Renewable availability factors (per technology per location)</a:t>
+            </a:r>
+          </a:p>
+          <a:p>
+            <a:pPr lvl="2"/>
+            <a:r>
+              <a:rPr lang="en-US" dirty="0" smtClean="0">
+                <a:sym typeface="Wingdings" panose="05000000000000000000" pitchFamily="2" charset="2"/>
+              </a:rPr>
+              <a:t>Admittance matrix</a:t>
+            </a:r>
+          </a:p>
+          <a:p>
+            <a:pPr marL="457200" lvl="1" indent="0">
+              <a:buNone/>
+            </a:pPr>
+            <a:r>
+              <a:rPr lang="en-US" dirty="0" smtClean="0">
+                <a:sym typeface="Wingdings" panose="05000000000000000000" pitchFamily="2" charset="2"/>
+              </a:rPr>
+              <a:t> Size of input vector quickly grows with number of buses</a:t>
+            </a:r>
+          </a:p>
+          <a:p>
+            <a:pPr lvl="2"/>
+            <a:endParaRPr lang="en-US" dirty="0" smtClean="0">
+              <a:sym typeface="Wingdings" panose="05000000000000000000" pitchFamily="2" charset="2"/>
+            </a:endParaRPr>
+          </a:p>
+          <a:p>
+            <a:pPr lvl="2"/>
+            <a:endParaRPr lang="en-US" dirty="0" smtClean="0">
+              <a:sym typeface="Wingdings" panose="05000000000000000000" pitchFamily="2" charset="2"/>
+            </a:endParaRPr>
+          </a:p>
+          <a:p>
+            <a:pPr lvl="1"/>
+            <a:endParaRPr lang="en-US" dirty="0" smtClean="0">
+              <a:sym typeface="Wingdings" panose="05000000000000000000" pitchFamily="2" charset="2"/>
+            </a:endParaRPr>
+          </a:p>
+          <a:p>
+            <a:pPr lvl="1"/>
+            <a:endParaRPr lang="en-US" dirty="0" smtClean="0"/>
+          </a:p>
+          <a:p>
+            <a:pPr lvl="1"/>
+            <a:endParaRPr lang="en-US" dirty="0"/>
+          </a:p>
+        </p:txBody>
+      </p:sp>
+      <p:sp>
+        <p:nvSpPr>
+          <p:cNvPr id="3" name="Footer Placeholder 2"/>
           <p:cNvSpPr>
             <a:spLocks noGrp="1"/>
           </p:cNvSpPr>
@@ -19725,15 +19722,16 @@
           <a:lstStyle/>
           <a:p>
             <a:r>
-              <a:rPr lang="nl-NL"/>
+              <a:rPr lang="nl-NL" smtClean="0"/>
               <a:t>Ingenieurswetenschappen, Werktuigkunde, TME</a:t>
             </a:r>
+            <a:endParaRPr lang="nl-NL"/>
           </a:p>
         </p:txBody>
       </p:sp>
       <p:sp>
         <p:nvSpPr>
-          <p:cNvPr id="3" name="Slide Number Placeholder 2"/>
+          <p:cNvPr id="4" name="Slide Number Placeholder 3"/>
           <p:cNvSpPr>
             <a:spLocks noGrp="1"/>
           </p:cNvSpPr>
@@ -19754,40 +19752,33 @@
           </a:p>
         </p:txBody>
       </p:sp>
-      <p:pic>
-        <p:nvPicPr>
-          <p:cNvPr id="4" name="Picture 3"/>
-          <p:cNvPicPr>
-            <a:picLocks noChangeAspect="1"/>
-          </p:cNvPicPr>
-          <p:nvPr/>
-        </p:nvPicPr>
-        <p:blipFill>
-          <a:blip r:embed="rId2">
-            <a:extLst>
-              <a:ext uri="{28A0092B-C50C-407E-A947-70E740481C1C}">
-                <a14:useLocalDpi xmlns:a14="http://schemas.microsoft.com/office/drawing/2010/main" val="0"/>
-              </a:ext>
-            </a:extLst>
-          </a:blip>
-          <a:stretch>
-            <a:fillRect/>
-          </a:stretch>
-        </p:blipFill>
-        <p:spPr>
-          <a:xfrm>
-            <a:off x="758283" y="115326"/>
-            <a:ext cx="10283407" cy="5782439"/>
-          </a:xfrm>
-          <a:prstGeom prst="rect">
-            <a:avLst/>
-          </a:prstGeom>
-        </p:spPr>
-      </p:pic>
+      <p:sp>
+        <p:nvSpPr>
+          <p:cNvPr id="5" name="Title 4"/>
+          <p:cNvSpPr>
+            <a:spLocks noGrp="1"/>
+          </p:cNvSpPr>
+          <p:nvPr>
+            <p:ph type="title"/>
+          </p:nvPr>
+        </p:nvSpPr>
+        <p:spPr/>
+        <p:txBody>
+          <a:bodyPr/>
+          <a:lstStyle/>
+          <a:p>
+            <a:r>
+              <a:rPr lang="en-US" dirty="0" smtClean="0"/>
+              <a:t>Neural Network for cost estimation</a:t>
+            </a:r>
+            <a:endParaRPr lang="en-US" dirty="0"/>
+          </a:p>
+        </p:txBody>
+      </p:sp>
     </p:spTree>
     <p:extLst>
       <p:ext uri="{BB962C8B-B14F-4D97-AF65-F5344CB8AC3E}">
-        <p14:creationId xmlns:p14="http://schemas.microsoft.com/office/powerpoint/2010/main" val="261656653"/>
+        <p14:creationId xmlns:p14="http://schemas.microsoft.com/office/powerpoint/2010/main" val="2844186355"/>
       </p:ext>
     </p:extLst>
   </p:cSld>

</xml_diff>